<commit_message>
[prg1] Adding cv5 notes
</commit_message>
<xml_diff>
--- a/data/2018-19/prg1/cv5/prg1_cv5.pptx
+++ b/data/2018-19/prg1/cv5/prg1_cv5.pptx
@@ -106,6 +106,11 @@
       </a:defRPr>
     </a:lvl9pPr>
   </p:defaultTextStyle>
+  <p:extLst>
+    <p:ext uri="{EFAFB233-063F-42B5-8137-9DF3F51BA10A}">
+      <p15:sldGuideLst xmlns:p15="http://schemas.microsoft.com/office/powerpoint/2012/main"/>
+    </p:ext>
+  </p:extLst>
 </p:presentation>
 </file>
 
@@ -298,7 +303,7 @@
             <a:fld id="{B61BEF0D-F0BB-DE4B-95CE-6DB70DBA9567}" type="datetimeFigureOut">
               <a:rPr lang="en-US" dirty="0"/>
               <a:pPr/>
-              <a:t>11/1/2018</a:t>
+              <a:t>11/2/2018</a:t>
             </a:fld>
             <a:endParaRPr lang="en-US" dirty="0"/>
           </a:p>
@@ -633,7 +638,7 @@
             <a:fld id="{B61BEF0D-F0BB-DE4B-95CE-6DB70DBA9567}" type="datetimeFigureOut">
               <a:rPr lang="en-US" dirty="0"/>
               <a:pPr/>
-              <a:t>11/1/2018</a:t>
+              <a:t>11/2/2018</a:t>
             </a:fld>
             <a:endParaRPr lang="en-US" dirty="0"/>
           </a:p>
@@ -1031,7 +1036,7 @@
             <a:fld id="{B61BEF0D-F0BB-DE4B-95CE-6DB70DBA9567}" type="datetimeFigureOut">
               <a:rPr lang="en-US" dirty="0"/>
               <a:pPr/>
-              <a:t>11/1/2018</a:t>
+              <a:t>11/2/2018</a:t>
             </a:fld>
             <a:endParaRPr lang="en-US" dirty="0"/>
           </a:p>
@@ -1364,7 +1369,7 @@
             <a:fld id="{B61BEF0D-F0BB-DE4B-95CE-6DB70DBA9567}" type="datetimeFigureOut">
               <a:rPr lang="en-US" dirty="0"/>
               <a:pPr/>
-              <a:t>11/1/2018</a:t>
+              <a:t>11/2/2018</a:t>
             </a:fld>
             <a:endParaRPr lang="en-US" dirty="0"/>
           </a:p>
@@ -1681,7 +1686,7 @@
             <a:fld id="{B61BEF0D-F0BB-DE4B-95CE-6DB70DBA9567}" type="datetimeFigureOut">
               <a:rPr lang="en-US" dirty="0"/>
               <a:pPr/>
-              <a:t>11/1/2018</a:t>
+              <a:t>11/2/2018</a:t>
             </a:fld>
             <a:endParaRPr lang="en-US" dirty="0"/>
           </a:p>
@@ -2074,7 +2079,7 @@
             <a:fld id="{B61BEF0D-F0BB-DE4B-95CE-6DB70DBA9567}" type="datetimeFigureOut">
               <a:rPr lang="en-US" dirty="0"/>
               <a:pPr/>
-              <a:t>11/1/2018</a:t>
+              <a:t>11/2/2018</a:t>
             </a:fld>
             <a:endParaRPr lang="en-US" dirty="0"/>
           </a:p>
@@ -2328,7 +2333,7 @@
             <a:fld id="{B61BEF0D-F0BB-DE4B-95CE-6DB70DBA9567}" type="datetimeFigureOut">
               <a:rPr lang="en-US" dirty="0"/>
               <a:pPr/>
-              <a:t>11/1/2018</a:t>
+              <a:t>11/2/2018</a:t>
             </a:fld>
             <a:endParaRPr lang="en-US" dirty="0"/>
           </a:p>
@@ -2587,7 +2592,7 @@
             <a:fld id="{B61BEF0D-F0BB-DE4B-95CE-6DB70DBA9567}" type="datetimeFigureOut">
               <a:rPr lang="en-US" dirty="0"/>
               <a:pPr/>
-              <a:t>11/1/2018</a:t>
+              <a:t>11/2/2018</a:t>
             </a:fld>
             <a:endParaRPr lang="en-US" dirty="0"/>
           </a:p>
@@ -2846,7 +2851,7 @@
             <a:fld id="{B61BEF0D-F0BB-DE4B-95CE-6DB70DBA9567}" type="datetimeFigureOut">
               <a:rPr lang="en-US" dirty="0"/>
               <a:pPr/>
-              <a:t>11/1/2018</a:t>
+              <a:t>11/2/2018</a:t>
             </a:fld>
             <a:endParaRPr lang="en-US" dirty="0"/>
           </a:p>
@@ -3172,7 +3177,7 @@
             <a:fld id="{B61BEF0D-F0BB-DE4B-95CE-6DB70DBA9567}" type="datetimeFigureOut">
               <a:rPr lang="en-US" dirty="0"/>
               <a:pPr/>
-              <a:t>11/1/2018</a:t>
+              <a:t>11/2/2018</a:t>
             </a:fld>
             <a:endParaRPr lang="en-US" dirty="0"/>
           </a:p>
@@ -3492,7 +3497,7 @@
             <a:fld id="{B61BEF0D-F0BB-DE4B-95CE-6DB70DBA9567}" type="datetimeFigureOut">
               <a:rPr lang="en-US" dirty="0"/>
               <a:pPr/>
-              <a:t>11/1/2018</a:t>
+              <a:t>11/2/2018</a:t>
             </a:fld>
             <a:endParaRPr lang="en-US" dirty="0"/>
           </a:p>
@@ -3946,7 +3951,7 @@
             <a:fld id="{B61BEF0D-F0BB-DE4B-95CE-6DB70DBA9567}" type="datetimeFigureOut">
               <a:rPr lang="en-US" dirty="0"/>
               <a:pPr/>
-              <a:t>11/1/2018</a:t>
+              <a:t>11/2/2018</a:t>
             </a:fld>
             <a:endParaRPr lang="en-US" dirty="0"/>
           </a:p>
@@ -4148,7 +4153,7 @@
             <a:fld id="{B61BEF0D-F0BB-DE4B-95CE-6DB70DBA9567}" type="datetimeFigureOut">
               <a:rPr lang="en-US" dirty="0"/>
               <a:pPr/>
-              <a:t>11/1/2018</a:t>
+              <a:t>11/2/2018</a:t>
             </a:fld>
             <a:endParaRPr lang="en-US" dirty="0"/>
           </a:p>
@@ -4322,7 +4327,7 @@
             <a:fld id="{B61BEF0D-F0BB-DE4B-95CE-6DB70DBA9567}" type="datetimeFigureOut">
               <a:rPr lang="en-US" dirty="0"/>
               <a:pPr/>
-              <a:t>11/1/2018</a:t>
+              <a:t>11/2/2018</a:t>
             </a:fld>
             <a:endParaRPr lang="en-US" dirty="0"/>
           </a:p>
@@ -4652,7 +4657,7 @@
             <a:fld id="{B61BEF0D-F0BB-DE4B-95CE-6DB70DBA9567}" type="datetimeFigureOut">
               <a:rPr lang="en-US" dirty="0"/>
               <a:pPr/>
-              <a:t>11/1/2018</a:t>
+              <a:t>11/2/2018</a:t>
             </a:fld>
             <a:endParaRPr lang="en-US" dirty="0"/>
           </a:p>
@@ -4994,7 +4999,7 @@
             <a:fld id="{B61BEF0D-F0BB-DE4B-95CE-6DB70DBA9567}" type="datetimeFigureOut">
               <a:rPr lang="en-US" dirty="0"/>
               <a:pPr/>
-              <a:t>11/1/2018</a:t>
+              <a:t>11/2/2018</a:t>
             </a:fld>
             <a:endParaRPr lang="en-US" dirty="0"/>
           </a:p>
@@ -7108,7 +7113,7 @@
             <a:fld id="{B61BEF0D-F0BB-DE4B-95CE-6DB70DBA9567}" type="datetimeFigureOut">
               <a:rPr lang="en-US" dirty="0"/>
               <a:pPr/>
-              <a:t>11/1/2018</a:t>
+              <a:t>11/2/2018</a:t>
             </a:fld>
             <a:endParaRPr lang="en-US" dirty="0"/>
           </a:p>
@@ -7689,6 +7694,13 @@
   <p:clrMapOvr>
     <a:masterClrMapping/>
   </p:clrMapOvr>
+  <p:timing>
+    <p:tnLst>
+      <p:par>
+        <p:cTn id="1" dur="indefinite" restart="never" nodeType="tmRoot"/>
+      </p:par>
+    </p:tnLst>
+  </p:timing>
 </p:sld>
 </file>
 
@@ -7774,7 +7786,15 @@
             </a:r>
             <a:r>
               <a:rPr lang="en-US" b="1" dirty="0"/>
-              <a:t> m: integer</a:t>
+              <a:t> </a:t>
+            </a:r>
+            <a:r>
+              <a:rPr lang="en-US" b="1" dirty="0" smtClean="0"/>
+              <a:t>min: </a:t>
+            </a:r>
+            <a:r>
+              <a:rPr lang="en-US" b="1" dirty="0"/>
+              <a:t>integer</a:t>
             </a:r>
             <a:r>
               <a:rPr lang="en-US" dirty="0"/>
@@ -7820,7 +7840,15 @@
             </a:pPr>
             <a:r>
               <a:rPr lang="en-US" dirty="0"/>
-              <a:t>      m := x</a:t>
+              <a:t>      </a:t>
+            </a:r>
+            <a:r>
+              <a:rPr lang="en-US" dirty="0" smtClean="0"/>
+              <a:t>min </a:t>
+            </a:r>
+            <a:r>
+              <a:rPr lang="en-US" dirty="0"/>
+              <a:t>:= x</a:t>
             </a:r>
           </a:p>
           <a:p>
@@ -7838,7 +7866,15 @@
             </a:pPr>
             <a:r>
               <a:rPr lang="en-US" dirty="0"/>
-              <a:t>      m := y;</a:t>
+              <a:t>      </a:t>
+            </a:r>
+            <a:r>
+              <a:rPr lang="en-US" dirty="0" smtClean="0"/>
+              <a:t>min </a:t>
+            </a:r>
+            <a:r>
+              <a:rPr lang="en-US" dirty="0"/>
+              <a:t>:= y;</a:t>
             </a:r>
           </a:p>
           <a:p>
@@ -7856,7 +7892,15 @@
             </a:pPr>
             <a:r>
               <a:rPr lang="en-US" dirty="0"/>
-              <a:t>   if z &lt;m then</a:t>
+              <a:t>   if z &lt;</a:t>
+            </a:r>
+            <a:r>
+              <a:rPr lang="en-US" dirty="0" smtClean="0"/>
+              <a:t>min </a:t>
+            </a:r>
+            <a:r>
+              <a:rPr lang="en-US" dirty="0"/>
+              <a:t>then</a:t>
             </a:r>
           </a:p>
           <a:p>
@@ -7865,7 +7909,15 @@
             </a:pPr>
             <a:r>
               <a:rPr lang="en-US" dirty="0"/>
-              <a:t>      m := z;</a:t>
+              <a:t>      </a:t>
+            </a:r>
+            <a:r>
+              <a:rPr lang="en-US" dirty="0" smtClean="0"/>
+              <a:t>min </a:t>
+            </a:r>
+            <a:r>
+              <a:rPr lang="en-US" dirty="0"/>
+              <a:t>:= z;</a:t>
             </a:r>
           </a:p>
           <a:p>
@@ -7897,6 +7949,13 @@
   <p:clrMapOvr>
     <a:masterClrMapping/>
   </p:clrMapOvr>
+  <p:timing>
+    <p:tnLst>
+      <p:par>
+        <p:cTn id="1" dur="indefinite" restart="never" nodeType="tmRoot"/>
+      </p:par>
+    </p:tnLst>
+  </p:timing>
 </p:sld>
 </file>
 
@@ -7970,11 +8029,19 @@
             <a:pPr lvl="1"/>
             <a:r>
               <a:rPr lang="cs-CZ" dirty="0" smtClean="0"/>
-              <a:t>[1,2,3,4,1,2,1,3]</a:t>
+              <a:t>[1,2,3,4,1,2,1,3</a:t>
+            </a:r>
+            <a:r>
+              <a:rPr lang="cs-CZ" dirty="0" smtClean="0"/>
+              <a:t>]</a:t>
             </a:r>
             <a:r>
               <a:rPr lang="en-US" dirty="0" smtClean="0"/>
-              <a:t>-&gt; 1~3x, 2~2x, 3~2x, 4~1x</a:t>
+              <a:t> -&gt; </a:t>
+            </a:r>
+            <a:r>
+              <a:rPr lang="en-US" dirty="0" smtClean="0"/>
+              <a:t>1~3x, 2~2x, 3~2x, 4~1x</a:t>
             </a:r>
             <a:endParaRPr lang="cs-CZ" dirty="0" smtClean="0"/>
           </a:p>
@@ -8015,8 +8082,13 @@
             </a:pPr>
             <a:r>
               <a:rPr lang="cs-CZ" dirty="0" smtClean="0"/>
-              <a:t>Součet prvků nad/pod diagonálou</a:t>
-            </a:r>
+              <a:t>Součet prvků nad/pod </a:t>
+            </a:r>
+            <a:r>
+              <a:rPr lang="cs-CZ" dirty="0" smtClean="0"/>
+              <a:t>diagonálou</a:t>
+            </a:r>
+            <a:endParaRPr lang="en-US" dirty="0" smtClean="0"/>
           </a:p>
           <a:p>
             <a:pPr>
@@ -8025,7 +8097,17 @@
             </a:pPr>
             <a:r>
               <a:rPr lang="cs-CZ" dirty="0" smtClean="0"/>
-              <a:t>Textový procesor – Word</a:t>
+              <a:t>Najít největší plochu se sousedními elementy pro číslo 1</a:t>
+            </a:r>
+          </a:p>
+          <a:p>
+            <a:pPr>
+              <a:buFont typeface="+mj-lt"/>
+              <a:buAutoNum type="arabicPeriod"/>
+            </a:pPr>
+            <a:r>
+              <a:rPr lang="cs-CZ" dirty="0" smtClean="0"/>
+              <a:t>Najít největší plochu tvořenou jedním číslem</a:t>
             </a:r>
           </a:p>
         </p:txBody>
@@ -8040,6 +8122,13 @@
   <p:clrMapOvr>
     <a:masterClrMapping/>
   </p:clrMapOvr>
+  <p:timing>
+    <p:tnLst>
+      <p:par>
+        <p:cTn id="1" dur="indefinite" restart="never" nodeType="tmRoot"/>
+      </p:par>
+    </p:tnLst>
+  </p:timing>
 </p:sld>
 </file>
 

</xml_diff>